<commit_message>
updating cam seminar presentation
</commit_message>
<xml_diff>
--- a/LaTech/CAM611_Seminar/CAM Seminar Presentation.pptx
+++ b/LaTech/CAM611_Seminar/CAM Seminar Presentation.pptx
@@ -697,6 +697,90 @@
 </file>
 
 <file path=ppt/notesSlides/notesSlide1.xml><?xml version="1.0" encoding="utf-8"?>
+<p:notes xmlns:a="http://schemas.openxmlformats.org/drawingml/2006/main" xmlns:r="http://schemas.openxmlformats.org/officeDocument/2006/relationships" xmlns:p="http://schemas.openxmlformats.org/presentationml/2006/main">
+  <p:cSld>
+    <p:spTree>
+      <p:nvGrpSpPr>
+        <p:cNvPr id="1" name=""/>
+        <p:cNvGrpSpPr/>
+        <p:nvPr/>
+      </p:nvGrpSpPr>
+      <p:grpSpPr>
+        <a:xfrm>
+          <a:off x="0" y="0"/>
+          <a:ext cx="0" cy="0"/>
+          <a:chOff x="0" y="0"/>
+          <a:chExt cx="0" cy="0"/>
+        </a:xfrm>
+      </p:grpSpPr>
+      <p:sp>
+        <p:nvSpPr>
+          <p:cNvPr id="2" name="Slide Image Placeholder 1"/>
+          <p:cNvSpPr>
+            <a:spLocks noGrp="1" noRot="1" noChangeAspect="1"/>
+          </p:cNvSpPr>
+          <p:nvPr>
+            <p:ph type="sldImg"/>
+          </p:nvPr>
+        </p:nvSpPr>
+        <p:spPr/>
+      </p:sp>
+      <p:sp>
+        <p:nvSpPr>
+          <p:cNvPr id="3" name="Notes Placeholder 2"/>
+          <p:cNvSpPr>
+            <a:spLocks noGrp="1"/>
+          </p:cNvSpPr>
+          <p:nvPr>
+            <p:ph type="body" idx="1"/>
+          </p:nvPr>
+        </p:nvSpPr>
+        <p:spPr/>
+        <p:txBody>
+          <a:bodyPr/>
+          <a:lstStyle/>
+          <a:p>
+            <a:endParaRPr lang="en-US" dirty="0"/>
+          </a:p>
+        </p:txBody>
+      </p:sp>
+      <p:sp>
+        <p:nvSpPr>
+          <p:cNvPr id="4" name="Slide Number Placeholder 3"/>
+          <p:cNvSpPr>
+            <a:spLocks noGrp="1"/>
+          </p:cNvSpPr>
+          <p:nvPr>
+            <p:ph type="sldNum" sz="quarter" idx="5"/>
+          </p:nvPr>
+        </p:nvSpPr>
+        <p:spPr/>
+        <p:txBody>
+          <a:bodyPr/>
+          <a:lstStyle/>
+          <a:p>
+            <a:fld id="{7725887C-DEA0-4760-90FD-30296DCF1D58}" type="slidenum">
+              <a:rPr lang="en-US" smtClean="0"/>
+              <a:t>2</a:t>
+            </a:fld>
+            <a:endParaRPr lang="en-US"/>
+          </a:p>
+        </p:txBody>
+      </p:sp>
+    </p:spTree>
+    <p:extLst>
+      <p:ext uri="{BB962C8B-B14F-4D97-AF65-F5344CB8AC3E}">
+        <p14:creationId xmlns:p14="http://schemas.microsoft.com/office/powerpoint/2010/main" val="458407817"/>
+      </p:ext>
+    </p:extLst>
+  </p:cSld>
+  <p:clrMapOvr>
+    <a:masterClrMapping/>
+  </p:clrMapOvr>
+</p:notes>
+</file>
+
+<file path=ppt/notesSlides/notesSlide2.xml><?xml version="1.0" encoding="utf-8"?>
 <p:notes xmlns:a="http://schemas.openxmlformats.org/drawingml/2006/main" xmlns:r="http://schemas.openxmlformats.org/officeDocument/2006/relationships" xmlns:p="http://schemas.openxmlformats.org/presentationml/2006/main">
   <p:cSld>
     <p:spTree>
@@ -4040,16 +4124,30 @@
             <p:ph type="subTitle" idx="1"/>
           </p:nvPr>
         </p:nvSpPr>
-        <p:spPr/>
+        <p:spPr>
+          <a:xfrm>
+            <a:off x="1524000" y="3602037"/>
+            <a:ext cx="9144000" cy="2387599"/>
+          </a:xfrm>
+        </p:spPr>
         <p:txBody>
           <a:bodyPr>
-            <a:normAutofit lnSpcReduction="10000"/>
+            <a:normAutofit fontScale="92500" lnSpcReduction="10000"/>
           </a:bodyPr>
           <a:lstStyle/>
+          <a:p>
+            <a:endParaRPr lang="en-US" dirty="0"/>
+          </a:p>
           <a:p>
             <a:r>
               <a:rPr lang="en-US" dirty="0"/>
               <a:t>Sunzid Hassan</a:t>
+            </a:r>
+          </a:p>
+          <a:p>
+            <a:r>
+              <a:rPr lang="en-US" dirty="0"/>
+              <a:t>Advisor: Dr. Lingxiao Wang</a:t>
             </a:r>
           </a:p>
           <a:p>
@@ -4230,12 +4328,14 @@
         </p:nvSpPr>
         <p:spPr/>
         <p:txBody>
-          <a:bodyPr/>
+          <a:bodyPr>
+            <a:normAutofit/>
+          </a:bodyPr>
           <a:lstStyle/>
           <a:p>
             <a:r>
               <a:rPr lang="en-US" dirty="0"/>
-              <a:t>Significance, Current Statue, Challenges, and Objective</a:t>
+              <a:t>Robotic Odor Source Localization</a:t>
             </a:r>
           </a:p>
         </p:txBody>
@@ -5482,7 +5582,7 @@
             </p:nvSpPr>
             <p:spPr>
               <a:xfrm>
-                <a:off x="1192082" y="2097955"/>
+                <a:off x="1192082" y="2289814"/>
                 <a:ext cx="2068860" cy="523220"/>
               </a:xfrm>
               <a:prstGeom prst="rect">
@@ -13714,6 +13814,47 @@
           </p:cxnSp>
         </p:grpSp>
       </p:grpSp>
+      <p:cxnSp>
+        <p:nvCxnSpPr>
+          <p:cNvPr id="4" name="Connector: Elbow 3">
+            <a:extLst>
+              <a:ext uri="{FF2B5EF4-FFF2-40B4-BE49-F238E27FC236}">
+                <a16:creationId xmlns:a16="http://schemas.microsoft.com/office/drawing/2014/main" id="{F9ECAF2E-1173-1031-3297-2B60FD017814}"/>
+              </a:ext>
+            </a:extLst>
+          </p:cNvPr>
+          <p:cNvCxnSpPr>
+            <a:stCxn id="100" idx="1"/>
+          </p:cNvCxnSpPr>
+          <p:nvPr/>
+        </p:nvCxnSpPr>
+        <p:spPr>
+          <a:xfrm rot="10800000" flipV="1">
+            <a:off x="6700156" y="5009273"/>
+            <a:ext cx="323546" cy="682595"/>
+          </a:xfrm>
+          <a:prstGeom prst="bentConnector2">
+            <a:avLst/>
+          </a:prstGeom>
+          <a:ln>
+            <a:tailEnd type="triangle"/>
+          </a:ln>
+        </p:spPr>
+        <p:style>
+          <a:lnRef idx="1">
+            <a:schemeClr val="dk1"/>
+          </a:lnRef>
+          <a:fillRef idx="0">
+            <a:schemeClr val="dk1"/>
+          </a:fillRef>
+          <a:effectRef idx="0">
+            <a:schemeClr val="dk1"/>
+          </a:effectRef>
+          <a:fontRef idx="minor">
+            <a:schemeClr val="tx1"/>
+          </a:fontRef>
+        </p:style>
+      </p:cxnSp>
     </p:spTree>
     <p:extLst>
       <p:ext uri="{BB962C8B-B14F-4D97-AF65-F5344CB8AC3E}">
@@ -14002,7 +14143,7 @@
         </p:blipFill>
         <p:spPr>
           <a:xfrm>
-            <a:off x="913298" y="2847272"/>
+            <a:off x="913298" y="2837440"/>
             <a:ext cx="6170592" cy="1181868"/>
           </a:xfrm>
           <a:prstGeom prst="rect">
@@ -14032,7 +14173,7 @@
         </p:blipFill>
         <p:spPr>
           <a:xfrm>
-            <a:off x="838200" y="4093709"/>
+            <a:off x="838200" y="4074045"/>
             <a:ext cx="6871681" cy="1260344"/>
           </a:xfrm>
           <a:prstGeom prst="rect">
@@ -14063,7 +14204,7 @@
         </p:blipFill>
         <p:spPr>
           <a:xfrm>
-            <a:off x="913298" y="1600835"/>
+            <a:off x="913298" y="1571339"/>
             <a:ext cx="7143260" cy="1246437"/>
           </a:xfrm>
           <a:prstGeom prst="rect">
@@ -14093,7 +14234,7 @@
         </p:blipFill>
         <p:spPr>
           <a:xfrm>
-            <a:off x="838200" y="5420791"/>
+            <a:off x="838200" y="5430623"/>
             <a:ext cx="7442835" cy="1245820"/>
           </a:xfrm>
           <a:prstGeom prst="rect">

</xml_diff>